<commit_message>
Adicionada a página "Produtos que adicionei"
</commit_message>
<xml_diff>
--- a/Wireframe do painel de usuário.pptx
+++ b/Wireframe do painel de usuário.pptx
@@ -9,6 +9,7 @@
     <p:sldId id="257" r:id="rId3"/>
     <p:sldId id="258" r:id="rId4"/>
     <p:sldId id="259" r:id="rId5"/>
+    <p:sldId id="260" r:id="rId6"/>
   </p:sldIdLst>
   <p:sldSz cx="12192000" cy="6858000"/>
   <p:notesSz cx="6858000" cy="9144000"/>
@@ -107,6 +108,11 @@
       </a:defRPr>
     </a:lvl9pPr>
   </p:defaultTextStyle>
+  <p:extLst>
+    <p:ext uri="{EFAFB233-063F-42B5-8137-9DF3F51BA10A}">
+      <p15:sldGuideLst xmlns:p15="http://schemas.microsoft.com/office/powerpoint/2012/main"/>
+    </p:ext>
+  </p:extLst>
 </p:presentation>
 </file>
 
@@ -241,7 +247,7 @@
           <a:p>
             <a:fld id="{5C6E79AC-E1E5-4F69-BE0B-181759E1D889}" type="datetimeFigureOut">
               <a:rPr lang="pt-BR" smtClean="0"/>
-              <a:t>26/03/2015</a:t>
+              <a:t>02/04/2015</a:t>
             </a:fld>
             <a:endParaRPr lang="pt-BR"/>
           </a:p>
@@ -411,7 +417,7 @@
           <a:p>
             <a:fld id="{5C6E79AC-E1E5-4F69-BE0B-181759E1D889}" type="datetimeFigureOut">
               <a:rPr lang="pt-BR" smtClean="0"/>
-              <a:t>26/03/2015</a:t>
+              <a:t>02/04/2015</a:t>
             </a:fld>
             <a:endParaRPr lang="pt-BR"/>
           </a:p>
@@ -591,7 +597,7 @@
           <a:p>
             <a:fld id="{5C6E79AC-E1E5-4F69-BE0B-181759E1D889}" type="datetimeFigureOut">
               <a:rPr lang="pt-BR" smtClean="0"/>
-              <a:t>26/03/2015</a:t>
+              <a:t>02/04/2015</a:t>
             </a:fld>
             <a:endParaRPr lang="pt-BR"/>
           </a:p>
@@ -761,7 +767,7 @@
           <a:p>
             <a:fld id="{5C6E79AC-E1E5-4F69-BE0B-181759E1D889}" type="datetimeFigureOut">
               <a:rPr lang="pt-BR" smtClean="0"/>
-              <a:t>26/03/2015</a:t>
+              <a:t>02/04/2015</a:t>
             </a:fld>
             <a:endParaRPr lang="pt-BR"/>
           </a:p>
@@ -1007,7 +1013,7 @@
           <a:p>
             <a:fld id="{5C6E79AC-E1E5-4F69-BE0B-181759E1D889}" type="datetimeFigureOut">
               <a:rPr lang="pt-BR" smtClean="0"/>
-              <a:t>26/03/2015</a:t>
+              <a:t>02/04/2015</a:t>
             </a:fld>
             <a:endParaRPr lang="pt-BR"/>
           </a:p>
@@ -1239,7 +1245,7 @@
           <a:p>
             <a:fld id="{5C6E79AC-E1E5-4F69-BE0B-181759E1D889}" type="datetimeFigureOut">
               <a:rPr lang="pt-BR" smtClean="0"/>
-              <a:t>26/03/2015</a:t>
+              <a:t>02/04/2015</a:t>
             </a:fld>
             <a:endParaRPr lang="pt-BR"/>
           </a:p>
@@ -1606,7 +1612,7 @@
           <a:p>
             <a:fld id="{5C6E79AC-E1E5-4F69-BE0B-181759E1D889}" type="datetimeFigureOut">
               <a:rPr lang="pt-BR" smtClean="0"/>
-              <a:t>26/03/2015</a:t>
+              <a:t>02/04/2015</a:t>
             </a:fld>
             <a:endParaRPr lang="pt-BR"/>
           </a:p>
@@ -1724,7 +1730,7 @@
           <a:p>
             <a:fld id="{5C6E79AC-E1E5-4F69-BE0B-181759E1D889}" type="datetimeFigureOut">
               <a:rPr lang="pt-BR" smtClean="0"/>
-              <a:t>26/03/2015</a:t>
+              <a:t>02/04/2015</a:t>
             </a:fld>
             <a:endParaRPr lang="pt-BR"/>
           </a:p>
@@ -1819,7 +1825,7 @@
           <a:p>
             <a:fld id="{5C6E79AC-E1E5-4F69-BE0B-181759E1D889}" type="datetimeFigureOut">
               <a:rPr lang="pt-BR" smtClean="0"/>
-              <a:t>26/03/2015</a:t>
+              <a:t>02/04/2015</a:t>
             </a:fld>
             <a:endParaRPr lang="pt-BR"/>
           </a:p>
@@ -2096,7 +2102,7 @@
           <a:p>
             <a:fld id="{5C6E79AC-E1E5-4F69-BE0B-181759E1D889}" type="datetimeFigureOut">
               <a:rPr lang="pt-BR" smtClean="0"/>
-              <a:t>26/03/2015</a:t>
+              <a:t>02/04/2015</a:t>
             </a:fld>
             <a:endParaRPr lang="pt-BR"/>
           </a:p>
@@ -2349,7 +2355,7 @@
           <a:p>
             <a:fld id="{5C6E79AC-E1E5-4F69-BE0B-181759E1D889}" type="datetimeFigureOut">
               <a:rPr lang="pt-BR" smtClean="0"/>
-              <a:t>26/03/2015</a:t>
+              <a:t>02/04/2015</a:t>
             </a:fld>
             <a:endParaRPr lang="pt-BR"/>
           </a:p>
@@ -2562,7 +2568,7 @@
           <a:p>
             <a:fld id="{5C6E79AC-E1E5-4F69-BE0B-181759E1D889}" type="datetimeFigureOut">
               <a:rPr lang="pt-BR" smtClean="0"/>
-              <a:t>26/03/2015</a:t>
+              <a:t>02/04/2015</a:t>
             </a:fld>
             <a:endParaRPr lang="pt-BR"/>
           </a:p>
@@ -3190,7 +3196,7 @@
         </p:nvSpPr>
         <p:spPr>
           <a:xfrm>
-            <a:off x="1984664" y="1589809"/>
+            <a:off x="1943099" y="1568968"/>
             <a:ext cx="9441873" cy="4587154"/>
           </a:xfrm>
           <a:prstGeom prst="rect">
@@ -3292,7 +3298,7 @@
         </p:nvSpPr>
         <p:spPr>
           <a:xfrm>
-            <a:off x="3740262" y="3722327"/>
+            <a:off x="2773277" y="3745490"/>
             <a:ext cx="1513608" cy="475600"/>
           </a:xfrm>
           <a:prstGeom prst="rect">
@@ -3334,7 +3340,7 @@
         </p:nvSpPr>
         <p:spPr>
           <a:xfrm>
-            <a:off x="7547031" y="3722327"/>
+            <a:off x="8346498" y="3758470"/>
             <a:ext cx="1513608" cy="475600"/>
           </a:xfrm>
           <a:prstGeom prst="rect">
@@ -3363,6 +3369,48 @@
             <a:r>
               <a:rPr lang="pt-BR" dirty="0" smtClean="0"/>
               <a:t>Minha Lista de Desejos</a:t>
+            </a:r>
+            <a:endParaRPr lang="pt-BR" dirty="0"/>
+          </a:p>
+        </p:txBody>
+      </p:sp>
+      <p:sp>
+        <p:nvSpPr>
+          <p:cNvPr id="11" name="Retângulo 10"/>
+          <p:cNvSpPr/>
+          <p:nvPr/>
+        </p:nvSpPr>
+        <p:spPr>
+          <a:xfrm>
+            <a:off x="5339196" y="3758470"/>
+            <a:ext cx="1513608" cy="475600"/>
+          </a:xfrm>
+          <a:prstGeom prst="rect">
+            <a:avLst/>
+          </a:prstGeom>
+        </p:spPr>
+        <p:style>
+          <a:lnRef idx="2">
+            <a:schemeClr val="accent6"/>
+          </a:lnRef>
+          <a:fillRef idx="1">
+            <a:schemeClr val="lt1"/>
+          </a:fillRef>
+          <a:effectRef idx="0">
+            <a:schemeClr val="accent6"/>
+          </a:effectRef>
+          <a:fontRef idx="minor">
+            <a:schemeClr val="dk1"/>
+          </a:fontRef>
+        </p:style>
+        <p:txBody>
+          <a:bodyPr rtlCol="0" anchor="ctr"/>
+          <a:lstStyle/>
+          <a:p>
+            <a:pPr algn="ctr"/>
+            <a:r>
+              <a:rPr lang="pt-BR" dirty="0" smtClean="0"/>
+              <a:t>Produtos que eu adicionei</a:t>
             </a:r>
             <a:endParaRPr lang="pt-BR" dirty="0"/>
           </a:p>
@@ -4338,6 +4386,727 @@
     <p:extLst>
       <p:ext uri="{BB962C8B-B14F-4D97-AF65-F5344CB8AC3E}">
         <p14:creationId xmlns:p14="http://schemas.microsoft.com/office/powerpoint/2010/main" val="3420933722"/>
+      </p:ext>
+    </p:extLst>
+  </p:cSld>
+  <p:clrMapOvr>
+    <a:masterClrMapping/>
+  </p:clrMapOvr>
+  <p:timing>
+    <p:tnLst>
+      <p:par>
+        <p:cTn id="1" dur="indefinite" restart="never" nodeType="tmRoot"/>
+      </p:par>
+    </p:tnLst>
+  </p:timing>
+</p:sld>
+</file>
+
+<file path=ppt/slides/slide5.xml><?xml version="1.0" encoding="utf-8"?>
+<p:sld xmlns:a="http://schemas.openxmlformats.org/drawingml/2006/main" xmlns:r="http://schemas.openxmlformats.org/officeDocument/2006/relationships" xmlns:p="http://schemas.openxmlformats.org/presentationml/2006/main">
+  <p:cSld>
+    <p:spTree>
+      <p:nvGrpSpPr>
+        <p:cNvPr id="1" name=""/>
+        <p:cNvGrpSpPr/>
+        <p:nvPr/>
+      </p:nvGrpSpPr>
+      <p:grpSpPr>
+        <a:xfrm>
+          <a:off x="0" y="0"/>
+          <a:ext cx="0" cy="0"/>
+          <a:chOff x="0" y="0"/>
+          <a:chExt cx="0" cy="0"/>
+        </a:xfrm>
+      </p:grpSpPr>
+      <p:sp>
+        <p:nvSpPr>
+          <p:cNvPr id="4" name="Espaço Reservado para Conteúdo 3"/>
+          <p:cNvSpPr>
+            <a:spLocks noGrp="1"/>
+          </p:cNvSpPr>
+          <p:nvPr>
+            <p:ph idx="1"/>
+          </p:nvPr>
+        </p:nvSpPr>
+        <p:spPr>
+          <a:xfrm>
+            <a:off x="665017" y="581891"/>
+            <a:ext cx="9933710" cy="602673"/>
+          </a:xfrm>
+          <a:prstGeom prst="rect">
+            <a:avLst/>
+          </a:prstGeom>
+        </p:spPr>
+        <p:style>
+          <a:lnRef idx="2">
+            <a:schemeClr val="dk1">
+              <a:shade val="50000"/>
+            </a:schemeClr>
+          </a:lnRef>
+          <a:fillRef idx="1">
+            <a:schemeClr val="dk1"/>
+          </a:fillRef>
+          <a:effectRef idx="0">
+            <a:schemeClr val="dk1"/>
+          </a:effectRef>
+          <a:fontRef idx="minor">
+            <a:schemeClr val="lt1"/>
+          </a:fontRef>
+        </p:style>
+        <p:txBody>
+          <a:bodyPr rtlCol="0" anchor="ctr"/>
+          <a:lstStyle/>
+          <a:p>
+            <a:pPr marL="0" indent="0" algn="ctr">
+              <a:buNone/>
+            </a:pPr>
+            <a:r>
+              <a:rPr lang="pt-BR" sz="1600" dirty="0" smtClean="0"/>
+              <a:t>Minha Lista de Desejo</a:t>
+            </a:r>
+            <a:endParaRPr lang="pt-BR" sz="1600" dirty="0"/>
+          </a:p>
+        </p:txBody>
+      </p:sp>
+      <p:sp>
+        <p:nvSpPr>
+          <p:cNvPr id="5" name="Retângulo 4"/>
+          <p:cNvSpPr/>
+          <p:nvPr/>
+        </p:nvSpPr>
+        <p:spPr>
+          <a:xfrm>
+            <a:off x="665018" y="1558636"/>
+            <a:ext cx="9933710" cy="4894119"/>
+          </a:xfrm>
+          <a:prstGeom prst="rect">
+            <a:avLst/>
+          </a:prstGeom>
+        </p:spPr>
+        <p:style>
+          <a:lnRef idx="2">
+            <a:schemeClr val="accent6"/>
+          </a:lnRef>
+          <a:fillRef idx="1">
+            <a:schemeClr val="lt1"/>
+          </a:fillRef>
+          <a:effectRef idx="0">
+            <a:schemeClr val="accent6"/>
+          </a:effectRef>
+          <a:fontRef idx="minor">
+            <a:schemeClr val="dk1"/>
+          </a:fontRef>
+        </p:style>
+        <p:txBody>
+          <a:bodyPr rtlCol="0" anchor="ctr"/>
+          <a:lstStyle/>
+          <a:p>
+            <a:pPr algn="ctr"/>
+            <a:endParaRPr lang="pt-BR"/>
+          </a:p>
+        </p:txBody>
+      </p:sp>
+      <p:pic>
+        <p:nvPicPr>
+          <p:cNvPr id="6" name="Imagem 5"/>
+          <p:cNvPicPr>
+            <a:picLocks noChangeAspect="1"/>
+          </p:cNvPicPr>
+          <p:nvPr/>
+        </p:nvPicPr>
+        <p:blipFill>
+          <a:blip r:embed="rId2">
+            <a:extLst>
+              <a:ext uri="{28A0092B-C50C-407E-A947-70E740481C1C}">
+                <a14:useLocalDpi xmlns:a14="http://schemas.microsoft.com/office/drawing/2010/main" val="0"/>
+              </a:ext>
+            </a:extLst>
+          </a:blip>
+          <a:stretch>
+            <a:fillRect/>
+          </a:stretch>
+        </p:blipFill>
+        <p:spPr>
+          <a:xfrm flipH="1">
+            <a:off x="967281" y="1662545"/>
+            <a:ext cx="1174173" cy="1174173"/>
+          </a:xfrm>
+          <a:prstGeom prst="rect">
+            <a:avLst/>
+          </a:prstGeom>
+        </p:spPr>
+      </p:pic>
+      <p:sp>
+        <p:nvSpPr>
+          <p:cNvPr id="7" name="Espaço Reservado para Conteúdo 3"/>
+          <p:cNvSpPr txBox="1">
+            <a:spLocks/>
+          </p:cNvSpPr>
+          <p:nvPr/>
+        </p:nvSpPr>
+        <p:spPr>
+          <a:xfrm>
+            <a:off x="2443717" y="2140527"/>
+            <a:ext cx="7697810" cy="602673"/>
+          </a:xfrm>
+          <a:prstGeom prst="rect">
+            <a:avLst/>
+          </a:prstGeom>
+          <a:ln>
+            <a:solidFill>
+              <a:schemeClr val="bg1"/>
+            </a:solidFill>
+          </a:ln>
+        </p:spPr>
+        <p:style>
+          <a:lnRef idx="2">
+            <a:schemeClr val="accent6"/>
+          </a:lnRef>
+          <a:fillRef idx="1">
+            <a:schemeClr val="lt1"/>
+          </a:fillRef>
+          <a:effectRef idx="0">
+            <a:schemeClr val="accent6"/>
+          </a:effectRef>
+          <a:fontRef idx="minor">
+            <a:schemeClr val="dk1"/>
+          </a:fontRef>
+        </p:style>
+        <p:txBody>
+          <a:bodyPr rot="0" spcFirstLastPara="0" vertOverflow="overflow" horzOverflow="overflow" vert="horz" wrap="square" lIns="91440" tIns="45720" rIns="91440" bIns="45720" numCol="1" spcCol="0" rtlCol="0" fromWordArt="0" anchor="ctr" anchorCtr="0" forceAA="0" compatLnSpc="1">
+            <a:prstTxWarp prst="textNoShape">
+              <a:avLst/>
+            </a:prstTxWarp>
+            <a:noAutofit/>
+          </a:bodyPr>
+          <a:lstStyle>
+            <a:lvl1pPr marL="228600" indent="-228600" algn="l" defTabSz="914400" rtl="0" eaLnBrk="1" latinLnBrk="0" hangingPunct="1">
+              <a:lnSpc>
+                <a:spcPct val="90000"/>
+              </a:lnSpc>
+              <a:spcBef>
+                <a:spcPts val="1000"/>
+              </a:spcBef>
+              <a:buFont typeface="Arial" panose="020B0604020202020204" pitchFamily="34" charset="0"/>
+              <a:buChar char="•"/>
+              <a:defRPr sz="2800" kern="1200">
+                <a:solidFill>
+                  <a:schemeClr val="lt1"/>
+                </a:solidFill>
+                <a:latin typeface="+mn-lt"/>
+                <a:ea typeface="+mn-ea"/>
+                <a:cs typeface="+mn-cs"/>
+              </a:defRPr>
+            </a:lvl1pPr>
+            <a:lvl2pPr marL="685800" indent="-228600" algn="l" defTabSz="914400" rtl="0" eaLnBrk="1" latinLnBrk="0" hangingPunct="1">
+              <a:lnSpc>
+                <a:spcPct val="90000"/>
+              </a:lnSpc>
+              <a:spcBef>
+                <a:spcPts val="500"/>
+              </a:spcBef>
+              <a:buFont typeface="Arial" panose="020B0604020202020204" pitchFamily="34" charset="0"/>
+              <a:buChar char="•"/>
+              <a:defRPr sz="2400" kern="1200">
+                <a:solidFill>
+                  <a:schemeClr val="lt1"/>
+                </a:solidFill>
+                <a:latin typeface="+mn-lt"/>
+                <a:ea typeface="+mn-ea"/>
+                <a:cs typeface="+mn-cs"/>
+              </a:defRPr>
+            </a:lvl2pPr>
+            <a:lvl3pPr marL="1143000" indent="-228600" algn="l" defTabSz="914400" rtl="0" eaLnBrk="1" latinLnBrk="0" hangingPunct="1">
+              <a:lnSpc>
+                <a:spcPct val="90000"/>
+              </a:lnSpc>
+              <a:spcBef>
+                <a:spcPts val="500"/>
+              </a:spcBef>
+              <a:buFont typeface="Arial" panose="020B0604020202020204" pitchFamily="34" charset="0"/>
+              <a:buChar char="•"/>
+              <a:defRPr sz="2000" kern="1200">
+                <a:solidFill>
+                  <a:schemeClr val="lt1"/>
+                </a:solidFill>
+                <a:latin typeface="+mn-lt"/>
+                <a:ea typeface="+mn-ea"/>
+                <a:cs typeface="+mn-cs"/>
+              </a:defRPr>
+            </a:lvl3pPr>
+            <a:lvl4pPr marL="1600200" indent="-228600" algn="l" defTabSz="914400" rtl="0" eaLnBrk="1" latinLnBrk="0" hangingPunct="1">
+              <a:lnSpc>
+                <a:spcPct val="90000"/>
+              </a:lnSpc>
+              <a:spcBef>
+                <a:spcPts val="500"/>
+              </a:spcBef>
+              <a:buFont typeface="Arial" panose="020B0604020202020204" pitchFamily="34" charset="0"/>
+              <a:buChar char="•"/>
+              <a:defRPr sz="1800" kern="1200">
+                <a:solidFill>
+                  <a:schemeClr val="lt1"/>
+                </a:solidFill>
+                <a:latin typeface="+mn-lt"/>
+                <a:ea typeface="+mn-ea"/>
+                <a:cs typeface="+mn-cs"/>
+              </a:defRPr>
+            </a:lvl4pPr>
+            <a:lvl5pPr marL="2057400" indent="-228600" algn="l" defTabSz="914400" rtl="0" eaLnBrk="1" latinLnBrk="0" hangingPunct="1">
+              <a:lnSpc>
+                <a:spcPct val="90000"/>
+              </a:lnSpc>
+              <a:spcBef>
+                <a:spcPts val="500"/>
+              </a:spcBef>
+              <a:buFont typeface="Arial" panose="020B0604020202020204" pitchFamily="34" charset="0"/>
+              <a:buChar char="•"/>
+              <a:defRPr sz="1800" kern="1200">
+                <a:solidFill>
+                  <a:schemeClr val="lt1"/>
+                </a:solidFill>
+                <a:latin typeface="+mn-lt"/>
+                <a:ea typeface="+mn-ea"/>
+                <a:cs typeface="+mn-cs"/>
+              </a:defRPr>
+            </a:lvl5pPr>
+            <a:lvl6pPr marL="2514600" indent="-228600" algn="l" defTabSz="914400" rtl="0" eaLnBrk="1" latinLnBrk="0" hangingPunct="1">
+              <a:lnSpc>
+                <a:spcPct val="90000"/>
+              </a:lnSpc>
+              <a:spcBef>
+                <a:spcPts val="500"/>
+              </a:spcBef>
+              <a:buFont typeface="Arial" panose="020B0604020202020204" pitchFamily="34" charset="0"/>
+              <a:buChar char="•"/>
+              <a:defRPr sz="1800" kern="1200">
+                <a:solidFill>
+                  <a:schemeClr val="lt1"/>
+                </a:solidFill>
+                <a:latin typeface="+mn-lt"/>
+                <a:ea typeface="+mn-ea"/>
+                <a:cs typeface="+mn-cs"/>
+              </a:defRPr>
+            </a:lvl6pPr>
+            <a:lvl7pPr marL="2971800" indent="-228600" algn="l" defTabSz="914400" rtl="0" eaLnBrk="1" latinLnBrk="0" hangingPunct="1">
+              <a:lnSpc>
+                <a:spcPct val="90000"/>
+              </a:lnSpc>
+              <a:spcBef>
+                <a:spcPts val="500"/>
+              </a:spcBef>
+              <a:buFont typeface="Arial" panose="020B0604020202020204" pitchFamily="34" charset="0"/>
+              <a:buChar char="•"/>
+              <a:defRPr sz="1800" kern="1200">
+                <a:solidFill>
+                  <a:schemeClr val="lt1"/>
+                </a:solidFill>
+                <a:latin typeface="+mn-lt"/>
+                <a:ea typeface="+mn-ea"/>
+                <a:cs typeface="+mn-cs"/>
+              </a:defRPr>
+            </a:lvl7pPr>
+            <a:lvl8pPr marL="3429000" indent="-228600" algn="l" defTabSz="914400" rtl="0" eaLnBrk="1" latinLnBrk="0" hangingPunct="1">
+              <a:lnSpc>
+                <a:spcPct val="90000"/>
+              </a:lnSpc>
+              <a:spcBef>
+                <a:spcPts val="500"/>
+              </a:spcBef>
+              <a:buFont typeface="Arial" panose="020B0604020202020204" pitchFamily="34" charset="0"/>
+              <a:buChar char="•"/>
+              <a:defRPr sz="1800" kern="1200">
+                <a:solidFill>
+                  <a:schemeClr val="lt1"/>
+                </a:solidFill>
+                <a:latin typeface="+mn-lt"/>
+                <a:ea typeface="+mn-ea"/>
+                <a:cs typeface="+mn-cs"/>
+              </a:defRPr>
+            </a:lvl8pPr>
+            <a:lvl9pPr marL="3886200" indent="-228600" algn="l" defTabSz="914400" rtl="0" eaLnBrk="1" latinLnBrk="0" hangingPunct="1">
+              <a:lnSpc>
+                <a:spcPct val="90000"/>
+              </a:lnSpc>
+              <a:spcBef>
+                <a:spcPts val="500"/>
+              </a:spcBef>
+              <a:buFont typeface="Arial" panose="020B0604020202020204" pitchFamily="34" charset="0"/>
+              <a:buChar char="•"/>
+              <a:defRPr sz="1800" kern="1200">
+                <a:solidFill>
+                  <a:schemeClr val="lt1"/>
+                </a:solidFill>
+                <a:latin typeface="+mn-lt"/>
+                <a:ea typeface="+mn-ea"/>
+                <a:cs typeface="+mn-cs"/>
+              </a:defRPr>
+            </a:lvl9pPr>
+          </a:lstStyle>
+          <a:p>
+            <a:pPr marL="0" indent="0">
+              <a:buFont typeface="Arial" panose="020B0604020202020204" pitchFamily="34" charset="0"/>
+              <a:buNone/>
+            </a:pPr>
+            <a:r>
+              <a:rPr lang="pt-BR" sz="1600" dirty="0" smtClean="0">
+                <a:solidFill>
+                  <a:schemeClr val="tx1"/>
+                </a:solidFill>
+              </a:rPr>
+              <a:t>Produtos que </a:t>
+            </a:r>
+            <a:r>
+              <a:rPr lang="pt-BR" sz="1600" smtClean="0">
+                <a:solidFill>
+                  <a:schemeClr val="tx1"/>
+                </a:solidFill>
+              </a:rPr>
+              <a:t>eu adicionei</a:t>
+            </a:r>
+            <a:endParaRPr lang="pt-BR" sz="1600" dirty="0"/>
+          </a:p>
+        </p:txBody>
+      </p:sp>
+      <p:sp>
+        <p:nvSpPr>
+          <p:cNvPr id="8" name="Retângulo 7"/>
+          <p:cNvSpPr/>
+          <p:nvPr/>
+        </p:nvSpPr>
+        <p:spPr>
+          <a:xfrm>
+            <a:off x="967281" y="3096491"/>
+            <a:ext cx="9267764" cy="3179618"/>
+          </a:xfrm>
+          <a:prstGeom prst="rect">
+            <a:avLst/>
+          </a:prstGeom>
+          <a:ln>
+            <a:solidFill>
+              <a:schemeClr val="bg1"/>
+            </a:solidFill>
+          </a:ln>
+        </p:spPr>
+        <p:style>
+          <a:lnRef idx="2">
+            <a:schemeClr val="accent6"/>
+          </a:lnRef>
+          <a:fillRef idx="1">
+            <a:schemeClr val="lt1"/>
+          </a:fillRef>
+          <a:effectRef idx="0">
+            <a:schemeClr val="accent6"/>
+          </a:effectRef>
+          <a:fontRef idx="minor">
+            <a:schemeClr val="dk1"/>
+          </a:fontRef>
+        </p:style>
+        <p:txBody>
+          <a:bodyPr rtlCol="0" anchor="ctr"/>
+          <a:lstStyle/>
+          <a:p>
+            <a:pPr algn="ctr"/>
+            <a:endParaRPr lang="pt-BR"/>
+          </a:p>
+        </p:txBody>
+      </p:sp>
+      <p:sp>
+        <p:nvSpPr>
+          <p:cNvPr id="9" name="Retângulo 8"/>
+          <p:cNvSpPr/>
+          <p:nvPr/>
+        </p:nvSpPr>
+        <p:spPr>
+          <a:xfrm>
+            <a:off x="952157" y="3262746"/>
+            <a:ext cx="2918919" cy="3013363"/>
+          </a:xfrm>
+          <a:prstGeom prst="rect">
+            <a:avLst/>
+          </a:prstGeom>
+          <a:ln>
+            <a:solidFill>
+              <a:schemeClr val="bg1"/>
+            </a:solidFill>
+          </a:ln>
+        </p:spPr>
+        <p:style>
+          <a:lnRef idx="2">
+            <a:schemeClr val="accent6"/>
+          </a:lnRef>
+          <a:fillRef idx="1">
+            <a:schemeClr val="lt1"/>
+          </a:fillRef>
+          <a:effectRef idx="0">
+            <a:schemeClr val="accent6"/>
+          </a:effectRef>
+          <a:fontRef idx="minor">
+            <a:schemeClr val="dk1"/>
+          </a:fontRef>
+        </p:style>
+        <p:txBody>
+          <a:bodyPr rtlCol="0" anchor="t"/>
+          <a:lstStyle/>
+          <a:p>
+            <a:pPr algn="ctr"/>
+            <a:r>
+              <a:rPr lang="pt-BR" dirty="0" smtClean="0"/>
+              <a:t>Produto 1</a:t>
+            </a:r>
+            <a:endParaRPr lang="pt-BR" dirty="0"/>
+          </a:p>
+        </p:txBody>
+      </p:sp>
+      <p:sp>
+        <p:nvSpPr>
+          <p:cNvPr id="10" name="CaixaDeTexto 9"/>
+          <p:cNvSpPr txBox="1"/>
+          <p:nvPr/>
+        </p:nvSpPr>
+        <p:spPr>
+          <a:xfrm>
+            <a:off x="1387649" y="4005695"/>
+            <a:ext cx="2078182" cy="1477328"/>
+          </a:xfrm>
+          <a:prstGeom prst="rect">
+            <a:avLst/>
+          </a:prstGeom>
+          <a:noFill/>
+        </p:spPr>
+        <p:txBody>
+          <a:bodyPr wrap="square" rtlCol="0">
+            <a:spAutoFit/>
+          </a:bodyPr>
+          <a:lstStyle/>
+          <a:p>
+            <a:r>
+              <a:rPr lang="pt-BR" dirty="0" smtClean="0"/>
+              <a:t>Nome</a:t>
+            </a:r>
+          </a:p>
+          <a:p>
+            <a:r>
+              <a:rPr lang="pt-BR" dirty="0" smtClean="0"/>
+              <a:t>Foto</a:t>
+            </a:r>
+          </a:p>
+          <a:p>
+            <a:r>
+              <a:rPr lang="pt-BR" dirty="0" smtClean="0"/>
+              <a:t>Preço</a:t>
+            </a:r>
+          </a:p>
+          <a:p>
+            <a:r>
+              <a:rPr lang="pt-BR" dirty="0" smtClean="0"/>
+              <a:t>Adicionado em ...</a:t>
+            </a:r>
+          </a:p>
+          <a:p>
+            <a:endParaRPr lang="pt-BR" dirty="0" smtClean="0"/>
+          </a:p>
+        </p:txBody>
+      </p:sp>
+      <p:sp>
+        <p:nvSpPr>
+          <p:cNvPr id="11" name="Retângulo 10"/>
+          <p:cNvSpPr/>
+          <p:nvPr/>
+        </p:nvSpPr>
+        <p:spPr>
+          <a:xfrm>
+            <a:off x="3752045" y="3221183"/>
+            <a:ext cx="2918919" cy="3013363"/>
+          </a:xfrm>
+          <a:prstGeom prst="rect">
+            <a:avLst/>
+          </a:prstGeom>
+          <a:ln>
+            <a:solidFill>
+              <a:schemeClr val="bg1"/>
+            </a:solidFill>
+          </a:ln>
+        </p:spPr>
+        <p:style>
+          <a:lnRef idx="2">
+            <a:schemeClr val="accent6"/>
+          </a:lnRef>
+          <a:fillRef idx="1">
+            <a:schemeClr val="lt1"/>
+          </a:fillRef>
+          <a:effectRef idx="0">
+            <a:schemeClr val="accent6"/>
+          </a:effectRef>
+          <a:fontRef idx="minor">
+            <a:schemeClr val="dk1"/>
+          </a:fontRef>
+        </p:style>
+        <p:txBody>
+          <a:bodyPr rtlCol="0" anchor="t"/>
+          <a:lstStyle/>
+          <a:p>
+            <a:pPr algn="ctr"/>
+            <a:r>
+              <a:rPr lang="pt-BR" dirty="0" smtClean="0"/>
+              <a:t>Produto 1</a:t>
+            </a:r>
+            <a:endParaRPr lang="pt-BR" dirty="0"/>
+          </a:p>
+        </p:txBody>
+      </p:sp>
+      <p:sp>
+        <p:nvSpPr>
+          <p:cNvPr id="12" name="Retângulo 11"/>
+          <p:cNvSpPr/>
+          <p:nvPr/>
+        </p:nvSpPr>
+        <p:spPr>
+          <a:xfrm>
+            <a:off x="6993545" y="3221182"/>
+            <a:ext cx="2918919" cy="3013363"/>
+          </a:xfrm>
+          <a:prstGeom prst="rect">
+            <a:avLst/>
+          </a:prstGeom>
+          <a:ln>
+            <a:solidFill>
+              <a:schemeClr val="bg1"/>
+            </a:solidFill>
+          </a:ln>
+        </p:spPr>
+        <p:style>
+          <a:lnRef idx="2">
+            <a:schemeClr val="accent6"/>
+          </a:lnRef>
+          <a:fillRef idx="1">
+            <a:schemeClr val="lt1"/>
+          </a:fillRef>
+          <a:effectRef idx="0">
+            <a:schemeClr val="accent6"/>
+          </a:effectRef>
+          <a:fontRef idx="minor">
+            <a:schemeClr val="dk1"/>
+          </a:fontRef>
+        </p:style>
+        <p:txBody>
+          <a:bodyPr rtlCol="0" anchor="t"/>
+          <a:lstStyle/>
+          <a:p>
+            <a:pPr algn="ctr"/>
+            <a:r>
+              <a:rPr lang="pt-BR" dirty="0" smtClean="0"/>
+              <a:t>Produto 1</a:t>
+            </a:r>
+            <a:endParaRPr lang="pt-BR" dirty="0"/>
+          </a:p>
+        </p:txBody>
+      </p:sp>
+      <p:sp>
+        <p:nvSpPr>
+          <p:cNvPr id="13" name="CaixaDeTexto 12"/>
+          <p:cNvSpPr txBox="1"/>
+          <p:nvPr/>
+        </p:nvSpPr>
+        <p:spPr>
+          <a:xfrm>
+            <a:off x="4562072" y="3947636"/>
+            <a:ext cx="2078182" cy="1477328"/>
+          </a:xfrm>
+          <a:prstGeom prst="rect">
+            <a:avLst/>
+          </a:prstGeom>
+          <a:noFill/>
+        </p:spPr>
+        <p:txBody>
+          <a:bodyPr wrap="square" rtlCol="0">
+            <a:spAutoFit/>
+          </a:bodyPr>
+          <a:lstStyle/>
+          <a:p>
+            <a:r>
+              <a:rPr lang="pt-BR" dirty="0" smtClean="0"/>
+              <a:t>Nome</a:t>
+            </a:r>
+          </a:p>
+          <a:p>
+            <a:r>
+              <a:rPr lang="pt-BR" dirty="0" smtClean="0"/>
+              <a:t>Foto</a:t>
+            </a:r>
+          </a:p>
+          <a:p>
+            <a:r>
+              <a:rPr lang="pt-BR" dirty="0" smtClean="0"/>
+              <a:t>Preço</a:t>
+            </a:r>
+          </a:p>
+          <a:p>
+            <a:r>
+              <a:rPr lang="pt-BR" dirty="0" smtClean="0"/>
+              <a:t>Adicionado em ...</a:t>
+            </a:r>
+          </a:p>
+          <a:p>
+            <a:endParaRPr lang="pt-BR" dirty="0" smtClean="0"/>
+          </a:p>
+        </p:txBody>
+      </p:sp>
+      <p:sp>
+        <p:nvSpPr>
+          <p:cNvPr id="14" name="CaixaDeTexto 13"/>
+          <p:cNvSpPr txBox="1"/>
+          <p:nvPr/>
+        </p:nvSpPr>
+        <p:spPr>
+          <a:xfrm>
+            <a:off x="7624562" y="3947636"/>
+            <a:ext cx="2078182" cy="1477328"/>
+          </a:xfrm>
+          <a:prstGeom prst="rect">
+            <a:avLst/>
+          </a:prstGeom>
+          <a:noFill/>
+        </p:spPr>
+        <p:txBody>
+          <a:bodyPr wrap="square" rtlCol="0">
+            <a:spAutoFit/>
+          </a:bodyPr>
+          <a:lstStyle/>
+          <a:p>
+            <a:r>
+              <a:rPr lang="pt-BR" dirty="0" smtClean="0"/>
+              <a:t>Nome</a:t>
+            </a:r>
+          </a:p>
+          <a:p>
+            <a:r>
+              <a:rPr lang="pt-BR" dirty="0" smtClean="0"/>
+              <a:t>Foto</a:t>
+            </a:r>
+          </a:p>
+          <a:p>
+            <a:r>
+              <a:rPr lang="pt-BR" dirty="0" smtClean="0"/>
+              <a:t>Preço</a:t>
+            </a:r>
+          </a:p>
+          <a:p>
+            <a:r>
+              <a:rPr lang="pt-BR" dirty="0" smtClean="0"/>
+              <a:t>Adicionado em ...</a:t>
+            </a:r>
+          </a:p>
+          <a:p>
+            <a:endParaRPr lang="pt-BR" dirty="0" smtClean="0"/>
+          </a:p>
+        </p:txBody>
+      </p:sp>
+    </p:spTree>
+    <p:extLst>
+      <p:ext uri="{BB962C8B-B14F-4D97-AF65-F5344CB8AC3E}">
+        <p14:creationId xmlns:p14="http://schemas.microsoft.com/office/powerpoint/2010/main" val="2013127599"/>
       </p:ext>
     </p:extLst>
   </p:cSld>

</xml_diff>